<commit_message>
Correction of some mistakes in the ppt
</commit_message>
<xml_diff>
--- a/Worldwide Hapiness Score between 2019 & 2020.pptx
+++ b/Worldwide Hapiness Score between 2019 & 2020.pptx
@@ -26441,27 +26441,27 @@
           <a:p>
             <a:pPr rtl="0"/>
             <a:r>
-              <a:rPr lang="es-ES" sz="3000" dirty="0" err="1"/>
+              <a:rPr lang="es-ES" sz="2400" dirty="0" err="1"/>
               <a:t>Worldwide</a:t>
             </a:r>
             <a:r>
-              <a:rPr lang="es-ES" sz="3000" dirty="0"/>
+              <a:rPr lang="es-ES" sz="2400" dirty="0"/>
               <a:t> </a:t>
             </a:r>
             <a:r>
-              <a:rPr lang="es-ES" sz="3000" dirty="0" err="1"/>
-              <a:t>Hapiness</a:t>
-            </a:r>
-            <a:r>
-              <a:rPr lang="es-ES" sz="3000" dirty="0"/>
+              <a:rPr lang="es-ES" sz="2400" dirty="0" err="1"/>
+              <a:t>Happiness</a:t>
+            </a:r>
+            <a:r>
+              <a:rPr lang="es-ES" sz="2400" dirty="0"/>
               <a:t> Score </a:t>
             </a:r>
             <a:r>
-              <a:rPr lang="es-ES" sz="3000" dirty="0" err="1"/>
+              <a:rPr lang="es-ES" sz="2400" dirty="0" err="1"/>
               <a:t>between</a:t>
             </a:r>
             <a:r>
-              <a:rPr lang="es-ES" sz="3000" dirty="0"/>
+              <a:rPr lang="es-ES" sz="2400" dirty="0"/>
               <a:t> 2019 &amp; 2020</a:t>
             </a:r>
           </a:p>
@@ -26495,7 +26495,7 @@
           <a:p>
             <a:pPr rtl="0"/>
             <a:r>
-              <a:rPr lang="es-ES" noProof="1"/>
+              <a:rPr lang="es-ES" sz="1800" noProof="1"/>
               <a:t>By:</a:t>
             </a:r>
           </a:p>
@@ -32289,12 +32289,12 @@
 </file>
 
 <file path=customXml/item1.xml><?xml version="1.0" encoding="utf-8"?>
-<?mso-contentType ?>
-<FormTemplates xmlns="http://schemas.microsoft.com/sharepoint/v3/contenttype/forms">
-  <Display>DocumentLibraryForm</Display>
-  <Edit>DocumentLibraryForm</Edit>
-  <New>DocumentLibraryForm</New>
-</FormTemplates>
+<p:properties xmlns:p="http://schemas.microsoft.com/office/2006/metadata/properties" xmlns:xsi="http://www.w3.org/2001/XMLSchema-instance" xmlns:pc="http://schemas.microsoft.com/office/infopath/2007/PartnerControls">
+  <documentManagement>
+    <_ip_UnifiedCompliancePolicyUIAction xmlns="http://schemas.microsoft.com/sharepoint/v3" xsi:nil="true"/>
+    <_ip_UnifiedCompliancePolicyProperties xmlns="http://schemas.microsoft.com/sharepoint/v3" xsi:nil="true"/>
+  </documentManagement>
+</p:properties>
 </file>
 
 <file path=customXml/item2.xml><?xml version="1.0" encoding="utf-8"?>
@@ -32506,18 +32506,20 @@
 </file>
 
 <file path=customXml/item3.xml><?xml version="1.0" encoding="utf-8"?>
-<p:properties xmlns:p="http://schemas.microsoft.com/office/2006/metadata/properties" xmlns:xsi="http://www.w3.org/2001/XMLSchema-instance" xmlns:pc="http://schemas.microsoft.com/office/infopath/2007/PartnerControls">
-  <documentManagement>
-    <_ip_UnifiedCompliancePolicyUIAction xmlns="http://schemas.microsoft.com/sharepoint/v3" xsi:nil="true"/>
-    <_ip_UnifiedCompliancePolicyProperties xmlns="http://schemas.microsoft.com/sharepoint/v3" xsi:nil="true"/>
-  </documentManagement>
-</p:properties>
+<?mso-contentType ?>
+<FormTemplates xmlns="http://schemas.microsoft.com/sharepoint/v3/contenttype/forms">
+  <Display>DocumentLibraryForm</Display>
+  <Edit>DocumentLibraryForm</Edit>
+  <New>DocumentLibraryForm</New>
+</FormTemplates>
 </file>
 
 <file path=customXml/itemProps1.xml><?xml version="1.0" encoding="utf-8"?>
-<ds:datastoreItem xmlns:ds="http://schemas.openxmlformats.org/officeDocument/2006/customXml" ds:itemID="{541EC539-8BB8-450C-A808-015610205AE1}">
+<ds:datastoreItem xmlns:ds="http://schemas.openxmlformats.org/officeDocument/2006/customXml" ds:itemID="{1FBB8BD0-1203-44FD-A239-ECC49F53881D}">
   <ds:schemaRefs>
-    <ds:schemaRef ds:uri="http://schemas.microsoft.com/sharepoint/v3/contenttype/forms"/>
+    <ds:schemaRef ds:uri="http://schemas.microsoft.com/office/2006/metadata/properties"/>
+    <ds:schemaRef ds:uri="http://schemas.microsoft.com/office/infopath/2007/PartnerControls"/>
+    <ds:schemaRef ds:uri="http://schemas.microsoft.com/sharepoint/v3"/>
   </ds:schemaRefs>
 </ds:datastoreItem>
 </file>
@@ -32543,11 +32545,9 @@
 </file>
 
 <file path=customXml/itemProps3.xml><?xml version="1.0" encoding="utf-8"?>
-<ds:datastoreItem xmlns:ds="http://schemas.openxmlformats.org/officeDocument/2006/customXml" ds:itemID="{1FBB8BD0-1203-44FD-A239-ECC49F53881D}">
+<ds:datastoreItem xmlns:ds="http://schemas.openxmlformats.org/officeDocument/2006/customXml" ds:itemID="{541EC539-8BB8-450C-A808-015610205AE1}">
   <ds:schemaRefs>
-    <ds:schemaRef ds:uri="http://schemas.microsoft.com/office/2006/metadata/properties"/>
-    <ds:schemaRef ds:uri="http://schemas.microsoft.com/office/infopath/2007/PartnerControls"/>
-    <ds:schemaRef ds:uri="http://schemas.microsoft.com/sharepoint/v3"/>
+    <ds:schemaRef ds:uri="http://schemas.microsoft.com/sharepoint/v3/contenttype/forms"/>
   </ds:schemaRefs>
 </ds:datastoreItem>
 </file>
</xml_diff>